<commit_message>
fix(docs): adds the new tecnology to build de project
</commit_message>
<xml_diff>
--- a/docs/PRIMEIRO_PPT_LES.pptx
+++ b/docs/PRIMEIRO_PPT_LES.pptx
@@ -6884,7 +6884,7 @@
         </p:blipFill>
         <p:spPr bwMode="auto">
           <a:xfrm>
-            <a:off x="4815834" y="1093390"/>
+            <a:off x="4806304" y="779012"/>
             <a:ext cx="2898775" cy="1741488"/>
           </a:xfrm>
           <a:prstGeom prst="rect">
@@ -6997,7 +6997,7 @@
         </p:blipFill>
         <p:spPr>
           <a:xfrm>
-            <a:off x="658813" y="1093390"/>
+            <a:off x="424681" y="1116748"/>
             <a:ext cx="3162733" cy="1935164"/>
           </a:xfrm>
           <a:prstGeom prst="rect">
@@ -7027,8 +7027,68 @@
         </p:blipFill>
         <p:spPr>
           <a:xfrm>
-            <a:off x="4498975" y="3591030"/>
+            <a:off x="4618831" y="4035791"/>
             <a:ext cx="4067944" cy="2288219"/>
+          </a:xfrm>
+          <a:prstGeom prst="rect">
+            <a:avLst/>
+          </a:prstGeom>
+        </p:spPr>
+      </p:pic>
+      <p:pic>
+        <p:nvPicPr>
+          <p:cNvPr id="3" name="Imagem 2">
+            <a:extLst>
+              <a:ext uri="{FF2B5EF4-FFF2-40B4-BE49-F238E27FC236}">
+                <a16:creationId xmlns:a16="http://schemas.microsoft.com/office/drawing/2014/main" id="{BDFC4079-D82A-FD9A-7842-E8DE1F997EE7}"/>
+              </a:ext>
+            </a:extLst>
+          </p:cNvPr>
+          <p:cNvPicPr>
+            <a:picLocks noChangeAspect="1"/>
+          </p:cNvPicPr>
+          <p:nvPr/>
+        </p:nvPicPr>
+        <p:blipFill>
+          <a:blip r:embed="rId7"/>
+          <a:stretch>
+            <a:fillRect/>
+          </a:stretch>
+        </p:blipFill>
+        <p:spPr>
+          <a:xfrm>
+            <a:off x="3587414" y="2917402"/>
+            <a:ext cx="1591071" cy="1591071"/>
+          </a:xfrm>
+          <a:prstGeom prst="rect">
+            <a:avLst/>
+          </a:prstGeom>
+        </p:spPr>
+      </p:pic>
+      <p:pic>
+        <p:nvPicPr>
+          <p:cNvPr id="5" name="Imagem 4" descr="JavaScript – Wikipédia, a enciclopédia livre">
+            <a:extLst>
+              <a:ext uri="{FF2B5EF4-FFF2-40B4-BE49-F238E27FC236}">
+                <a16:creationId xmlns:a16="http://schemas.microsoft.com/office/drawing/2014/main" id="{4008B50C-9C41-28C2-9ED7-53C9AEE9A5ED}"/>
+              </a:ext>
+            </a:extLst>
+          </p:cNvPr>
+          <p:cNvPicPr>
+            <a:picLocks noChangeAspect="1"/>
+          </p:cNvPicPr>
+          <p:nvPr/>
+        </p:nvPicPr>
+        <p:blipFill>
+          <a:blip r:embed="rId8"/>
+          <a:stretch>
+            <a:fillRect/>
+          </a:stretch>
+        </p:blipFill>
+        <p:spPr>
+          <a:xfrm>
+            <a:off x="6397377" y="2750237"/>
+            <a:ext cx="1589335" cy="1589335"/>
           </a:xfrm>
           <a:prstGeom prst="rect">
             <a:avLst/>
@@ -8123,6 +8183,15 @@
 </file>
 
 <file path=customXml/item1.xml><?xml version="1.0" encoding="utf-8"?>
+<?mso-contentType ?>
+<FormTemplates xmlns="http://schemas.microsoft.com/sharepoint/v3/contenttype/forms">
+  <Display>DocumentLibraryForm</Display>
+  <Edit>DocumentLibraryForm</Edit>
+  <New>DocumentLibraryForm</New>
+</FormTemplates>
+</file>
+
+<file path=customXml/item2.xml><?xml version="1.0" encoding="utf-8"?>
 <ct:contentTypeSchema xmlns:ct="http://schemas.microsoft.com/office/2006/metadata/contentType" xmlns:ma="http://schemas.microsoft.com/office/2006/metadata/properties/metaAttributes" ct:_="" ma:_="" ma:contentTypeName="Documento" ma:contentTypeID="0x01010012A61D42B42D474CB136303E61568CE3" ma:contentTypeVersion="3" ma:contentTypeDescription="Crie um novo documento." ma:contentTypeScope="" ma:versionID="bf80d49507d8960ae98179a6e6652817">
   <xsd:schema xmlns:xsd="http://www.w3.org/2001/XMLSchema" xmlns:xs="http://www.w3.org/2001/XMLSchema" xmlns:p="http://schemas.microsoft.com/office/2006/metadata/properties" xmlns:ns2="e01ca050-92d0-4f72-be4a-edbdca92f0cc" targetNamespace="http://schemas.microsoft.com/office/2006/metadata/properties" ma:root="true" ma:fieldsID="fbf445917b59f41bf9d384aef2998be7" ns2:_="">
     <xsd:import namespace="e01ca050-92d0-4f72-be4a-edbdca92f0cc"/>
@@ -8260,16 +8329,15 @@
 </ct:contentTypeSchema>
 </file>
 
-<file path=customXml/item2.xml><?xml version="1.0" encoding="utf-8"?>
-<?mso-contentType ?>
-<FormTemplates xmlns="http://schemas.microsoft.com/sharepoint/v3/contenttype/forms">
-  <Display>DocumentLibraryForm</Display>
-  <Edit>DocumentLibraryForm</Edit>
-  <New>DocumentLibraryForm</New>
-</FormTemplates>
+<file path=customXml/itemProps1.xml><?xml version="1.0" encoding="utf-8"?>
+<ds:datastoreItem xmlns:ds="http://schemas.openxmlformats.org/officeDocument/2006/customXml" ds:itemID="{4D6C0C9D-82B2-404E-8792-1517863E9D8D}">
+  <ds:schemaRefs>
+    <ds:schemaRef ds:uri="http://schemas.microsoft.com/sharepoint/v3/contenttype/forms"/>
+  </ds:schemaRefs>
+</ds:datastoreItem>
 </file>
 
-<file path=customXml/itemProps1.xml><?xml version="1.0" encoding="utf-8"?>
+<file path=customXml/itemProps2.xml><?xml version="1.0" encoding="utf-8"?>
 <ds:datastoreItem xmlns:ds="http://schemas.openxmlformats.org/officeDocument/2006/customXml" ds:itemID="{64049CDB-41EB-481D-A68E-0D1F27266E8F}">
   <ds:schemaRefs>
     <ds:schemaRef ds:uri="http://schemas.microsoft.com/office/2006/metadata/contentType"/>
@@ -8285,12 +8353,4 @@
     <ds:schemaRef ds:uri="http://schemas.microsoft.com/internal/obd"/>
   </ds:schemaRefs>
 </ds:datastoreItem>
-</file>
-
-<file path=customXml/itemProps2.xml><?xml version="1.0" encoding="utf-8"?>
-<ds:datastoreItem xmlns:ds="http://schemas.openxmlformats.org/officeDocument/2006/customXml" ds:itemID="{4D6C0C9D-82B2-404E-8792-1517863E9D8D}">
-  <ds:schemaRefs>
-    <ds:schemaRef ds:uri="http://schemas.microsoft.com/sharepoint/v3/contenttype/forms"/>
-  </ds:schemaRefs>
-</ds:datastoreItem>
 </file>
</xml_diff>